<commit_message>
Fix error en cota de fibonacci
</commit_message>
<xml_diff>
--- a/Clases/07 - Árboles AVL/07. Árboles AVL.pptx
+++ b/Clases/07 - Árboles AVL/07. Árboles AVL.pptx
@@ -246,7 +246,7 @@
           <a:p>
             <a:fld id="{35ED76A3-EFA0-4F8F-8DCF-3DB05C2BC51A}" type="datetimeFigureOut">
               <a:rPr lang="es-CL" smtClean="0"/>
-              <a:t>14-09-20</a:t>
+              <a:t>14-09-2020</a:t>
             </a:fld>
             <a:endParaRPr lang="es-CL"/>
           </a:p>
@@ -29551,7 +29551,7 @@
           </a:ln>
           <a:extLst>
             <a:ext uri="{909E8E84-426E-40dd-AFC4-6F175D3DCCD1}">
-              <a14:hiddenFill xmlns:a14="http://schemas.microsoft.com/office/drawing/2010/main" xmlns="">
+              <a14:hiddenFill xmlns="" xmlns:a14="http://schemas.microsoft.com/office/drawing/2010/main">
                 <a:noFill/>
               </a14:hiddenFill>
             </a:ext>
@@ -29593,7 +29593,7 @@
           </a:ln>
           <a:extLst>
             <a:ext uri="{909E8E84-426E-40dd-AFC4-6F175D3DCCD1}">
-              <a14:hiddenFill xmlns:a14="http://schemas.microsoft.com/office/drawing/2010/main" xmlns="">
+              <a14:hiddenFill xmlns="" xmlns:a14="http://schemas.microsoft.com/office/drawing/2010/main">
                 <a:noFill/>
               </a14:hiddenFill>
             </a:ext>
@@ -29782,7 +29782,7 @@
           </a:ln>
           <a:extLst>
             <a:ext uri="{909E8E84-426E-40dd-AFC4-6F175D3DCCD1}">
-              <a14:hiddenFill xmlns:a14="http://schemas.microsoft.com/office/drawing/2010/main" xmlns="">
+              <a14:hiddenFill xmlns="" xmlns:a14="http://schemas.microsoft.com/office/drawing/2010/main">
                 <a:noFill/>
               </a14:hiddenFill>
             </a:ext>
@@ -29824,7 +29824,7 @@
           </a:ln>
           <a:extLst>
             <a:ext uri="{909E8E84-426E-40dd-AFC4-6F175D3DCCD1}">
-              <a14:hiddenFill xmlns:a14="http://schemas.microsoft.com/office/drawing/2010/main" xmlns="">
+              <a14:hiddenFill xmlns="" xmlns:a14="http://schemas.microsoft.com/office/drawing/2010/main">
                 <a:noFill/>
               </a14:hiddenFill>
             </a:ext>
@@ -29866,7 +29866,7 @@
           </a:ln>
           <a:extLst>
             <a:ext uri="{909E8E84-426E-40dd-AFC4-6F175D3DCCD1}">
-              <a14:hiddenFill xmlns:a14="http://schemas.microsoft.com/office/drawing/2010/main" xmlns="">
+              <a14:hiddenFill xmlns="" xmlns:a14="http://schemas.microsoft.com/office/drawing/2010/main">
                 <a:noFill/>
               </a14:hiddenFill>
             </a:ext>
@@ -29908,7 +29908,7 @@
           </a:ln>
           <a:extLst>
             <a:ext uri="{909E8E84-426E-40dd-AFC4-6F175D3DCCD1}">
-              <a14:hiddenFill xmlns:a14="http://schemas.microsoft.com/office/drawing/2010/main" xmlns="">
+              <a14:hiddenFill xmlns="" xmlns:a14="http://schemas.microsoft.com/office/drawing/2010/main">
                 <a:noFill/>
               </a14:hiddenFill>
             </a:ext>
@@ -29949,7 +29949,7 @@
           </a:ln>
           <a:extLst>
             <a:ext uri="{909E8E84-426E-40dd-AFC4-6F175D3DCCD1}">
-              <a14:hiddenFill xmlns:a14="http://schemas.microsoft.com/office/drawing/2010/main" xmlns="">
+              <a14:hiddenFill xmlns="" xmlns:a14="http://schemas.microsoft.com/office/drawing/2010/main">
                 <a:noFill/>
               </a14:hiddenFill>
             </a:ext>
@@ -29990,7 +29990,7 @@
           </a:ln>
           <a:extLst>
             <a:ext uri="{909E8E84-426E-40dd-AFC4-6F175D3DCCD1}">
-              <a14:hiddenFill xmlns:a14="http://schemas.microsoft.com/office/drawing/2010/main" xmlns="">
+              <a14:hiddenFill xmlns="" xmlns:a14="http://schemas.microsoft.com/office/drawing/2010/main">
                 <a:noFill/>
               </a14:hiddenFill>
             </a:ext>
@@ -30031,7 +30031,7 @@
           </a:ln>
           <a:extLst>
             <a:ext uri="{909E8E84-426E-40dd-AFC4-6F175D3DCCD1}">
-              <a14:hiddenFill xmlns:a14="http://schemas.microsoft.com/office/drawing/2010/main" xmlns="">
+              <a14:hiddenFill xmlns="" xmlns:a14="http://schemas.microsoft.com/office/drawing/2010/main">
                 <a:noFill/>
               </a14:hiddenFill>
             </a:ext>
@@ -30066,14 +30066,14 @@
           </a:ln>
           <a:extLst>
             <a:ext uri="{909E8E84-426E-40dd-AFC4-6F175D3DCCD1}">
-              <a14:hiddenFill xmlns:a14="http://schemas.microsoft.com/office/drawing/2010/main" xmlns="">
+              <a14:hiddenFill xmlns="" xmlns:a14="http://schemas.microsoft.com/office/drawing/2010/main">
                 <a:solidFill>
                   <a:srgbClr val="FFFFFF"/>
                 </a:solidFill>
               </a14:hiddenFill>
             </a:ext>
             <a:ext uri="{91240B29-F687-4f45-9708-019B960494DF}">
-              <a14:hiddenLine xmlns:a14="http://schemas.microsoft.com/office/drawing/2010/main" xmlns="" w="9525">
+              <a14:hiddenLine xmlns="" xmlns:a14="http://schemas.microsoft.com/office/drawing/2010/main" w="9525">
                 <a:solidFill>
                   <a:srgbClr val="000000"/>
                 </a:solidFill>
@@ -30236,14 +30236,14 @@
           </a:ln>
           <a:extLst>
             <a:ext uri="{909E8E84-426E-40dd-AFC4-6F175D3DCCD1}">
-              <a14:hiddenFill xmlns:a14="http://schemas.microsoft.com/office/drawing/2010/main" xmlns="">
+              <a14:hiddenFill xmlns="" xmlns:a14="http://schemas.microsoft.com/office/drawing/2010/main">
                 <a:solidFill>
                   <a:srgbClr val="FFFFFF"/>
                 </a:solidFill>
               </a14:hiddenFill>
             </a:ext>
             <a:ext uri="{91240B29-F687-4f45-9708-019B960494DF}">
-              <a14:hiddenLine xmlns:a14="http://schemas.microsoft.com/office/drawing/2010/main" xmlns="" w="9525">
+              <a14:hiddenLine xmlns="" xmlns:a14="http://schemas.microsoft.com/office/drawing/2010/main" w="9525">
                 <a:solidFill>
                   <a:srgbClr val="000000"/>
                 </a:solidFill>
@@ -30406,14 +30406,14 @@
           </a:ln>
           <a:extLst>
             <a:ext uri="{909E8E84-426E-40dd-AFC4-6F175D3DCCD1}">
-              <a14:hiddenFill xmlns:a14="http://schemas.microsoft.com/office/drawing/2010/main" xmlns="">
+              <a14:hiddenFill xmlns="" xmlns:a14="http://schemas.microsoft.com/office/drawing/2010/main">
                 <a:solidFill>
                   <a:srgbClr val="FFFFFF"/>
                 </a:solidFill>
               </a14:hiddenFill>
             </a:ext>
             <a:ext uri="{91240B29-F687-4f45-9708-019B960494DF}">
-              <a14:hiddenLine xmlns:a14="http://schemas.microsoft.com/office/drawing/2010/main" xmlns="" w="9525">
+              <a14:hiddenLine xmlns="" xmlns:a14="http://schemas.microsoft.com/office/drawing/2010/main" w="9525">
                 <a:solidFill>
                   <a:srgbClr val="000000"/>
                 </a:solidFill>
@@ -30576,14 +30576,14 @@
           </a:ln>
           <a:extLst>
             <a:ext uri="{909E8E84-426E-40dd-AFC4-6F175D3DCCD1}">
-              <a14:hiddenFill xmlns:a14="http://schemas.microsoft.com/office/drawing/2010/main" xmlns="">
+              <a14:hiddenFill xmlns="" xmlns:a14="http://schemas.microsoft.com/office/drawing/2010/main">
                 <a:solidFill>
                   <a:srgbClr val="FFFFFF"/>
                 </a:solidFill>
               </a14:hiddenFill>
             </a:ext>
             <a:ext uri="{91240B29-F687-4f45-9708-019B960494DF}">
-              <a14:hiddenLine xmlns:a14="http://schemas.microsoft.com/office/drawing/2010/main" xmlns="" w="9525">
+              <a14:hiddenLine xmlns="" xmlns:a14="http://schemas.microsoft.com/office/drawing/2010/main" w="9525">
                 <a:solidFill>
                   <a:srgbClr val="000000"/>
                 </a:solidFill>
@@ -30746,14 +30746,14 @@
           </a:ln>
           <a:extLst>
             <a:ext uri="{909E8E84-426E-40dd-AFC4-6F175D3DCCD1}">
-              <a14:hiddenFill xmlns:a14="http://schemas.microsoft.com/office/drawing/2010/main" xmlns="">
+              <a14:hiddenFill xmlns="" xmlns:a14="http://schemas.microsoft.com/office/drawing/2010/main">
                 <a:solidFill>
                   <a:srgbClr val="FFFFFF"/>
                 </a:solidFill>
               </a14:hiddenFill>
             </a:ext>
             <a:ext uri="{91240B29-F687-4f45-9708-019B960494DF}">
-              <a14:hiddenLine xmlns:a14="http://schemas.microsoft.com/office/drawing/2010/main" xmlns="" w="9525">
+              <a14:hiddenLine xmlns="" xmlns:a14="http://schemas.microsoft.com/office/drawing/2010/main" w="9525">
                 <a:solidFill>
                   <a:srgbClr val="000000"/>
                 </a:solidFill>
@@ -30888,8 +30888,8 @@
           </a:p>
         </p:txBody>
       </p:sp>
-      <mc:AlternateContent xmlns:mc="http://schemas.openxmlformats.org/markup-compatibility/2006">
-        <mc:Choice xmlns:a14="http://schemas.microsoft.com/office/drawing/2010/main" Requires="a14">
+      <mc:AlternateContent xmlns:mc="http://schemas.openxmlformats.org/markup-compatibility/2006" xmlns:a14="http://schemas.microsoft.com/office/drawing/2010/main">
+        <mc:Choice Requires="a14">
           <p:sp>
             <p:nvSpPr>
               <p:cNvPr id="25" name="Content Placeholder 2">
@@ -31265,7 +31265,7 @@
             </p:txBody>
           </p:sp>
         </mc:Choice>
-        <mc:Fallback>
+        <mc:Fallback xmlns="">
           <p:sp>
             <p:nvSpPr>
               <p:cNvPr id="25" name="Content Placeholder 2">
@@ -32408,8 +32408,8 @@
           </a:p>
         </p:txBody>
       </p:sp>
-      <mc:AlternateContent xmlns:mc="http://schemas.openxmlformats.org/markup-compatibility/2006">
-        <mc:Choice xmlns:a14="http://schemas.microsoft.com/office/drawing/2010/main" Requires="a14">
+      <mc:AlternateContent xmlns:mc="http://schemas.openxmlformats.org/markup-compatibility/2006" xmlns:a14="http://schemas.microsoft.com/office/drawing/2010/main">
+        <mc:Choice Requires="a14">
           <p:sp>
             <p:nvSpPr>
               <p:cNvPr id="4" name="Content Placeholder 3">
@@ -32577,7 +32577,7 @@
             </p:txBody>
           </p:sp>
         </mc:Choice>
-        <mc:Fallback>
+        <mc:Fallback xmlns="">
           <p:sp>
             <p:nvSpPr>
               <p:cNvPr id="4" name="Content Placeholder 3">
@@ -32681,8 +32681,8 @@
           </a:p>
         </p:txBody>
       </p:sp>
-      <mc:AlternateContent xmlns:mc="http://schemas.openxmlformats.org/markup-compatibility/2006">
-        <mc:Choice xmlns:a14="http://schemas.microsoft.com/office/drawing/2010/main" Requires="a14">
+      <mc:AlternateContent xmlns:mc="http://schemas.openxmlformats.org/markup-compatibility/2006" xmlns:a14="http://schemas.microsoft.com/office/drawing/2010/main">
+        <mc:Choice Requires="a14">
           <p:sp>
             <p:nvSpPr>
               <p:cNvPr id="3" name="Marcador de contenido 2">
@@ -33001,7 +33001,7 @@
             </p:txBody>
           </p:sp>
         </mc:Choice>
-        <mc:Fallback>
+        <mc:Fallback xmlns="">
           <p:sp>
             <p:nvSpPr>
               <p:cNvPr id="3" name="Marcador de contenido 2">
@@ -33101,8 +33101,8 @@
           </a:p>
         </p:txBody>
       </p:sp>
-      <mc:AlternateContent xmlns:mc="http://schemas.openxmlformats.org/markup-compatibility/2006">
-        <mc:Choice xmlns:a14="http://schemas.microsoft.com/office/drawing/2010/main" Requires="a14">
+      <mc:AlternateContent xmlns:mc="http://schemas.openxmlformats.org/markup-compatibility/2006" xmlns:a14="http://schemas.microsoft.com/office/drawing/2010/main">
+        <mc:Choice Requires="a14">
           <p:sp>
             <p:nvSpPr>
               <p:cNvPr id="3" name="Content Placeholder 2">
@@ -33482,7 +33482,7 @@
             </p:txBody>
           </p:sp>
         </mc:Choice>
-        <mc:Fallback>
+        <mc:Fallback xmlns="">
           <p:sp>
             <p:nvSpPr>
               <p:cNvPr id="3" name="Content Placeholder 2">
@@ -33611,8 +33611,32 @@
                   <a:buNone/>
                 </a:pPr>
                 <a:r>
-                  <a:rPr lang="en-US" sz="2200"/>
-                  <a:t>Esta recurrencia es similar a la recurrencia para la secuencia de Fibonacci</a:t>
+                  <a:rPr lang="en-US" sz="2200" dirty="0"/>
+                  <a:t>Esta </a:t>
+                </a:r>
+                <a:r>
+                  <a:rPr lang="en-US" sz="2200" dirty="0" err="1"/>
+                  <a:t>recurrencia</a:t>
+                </a:r>
+                <a:r>
+                  <a:rPr lang="en-US" sz="2200" dirty="0"/>
+                  <a:t> es similar a la </a:t>
+                </a:r>
+                <a:r>
+                  <a:rPr lang="en-US" sz="2200" dirty="0" err="1"/>
+                  <a:t>recurrencia</a:t>
+                </a:r>
+                <a:r>
+                  <a:rPr lang="en-US" sz="2200" dirty="0"/>
+                  <a:t> para la </a:t>
+                </a:r>
+                <a:r>
+                  <a:rPr lang="en-US" sz="2200" dirty="0" err="1"/>
+                  <a:t>secuencia</a:t>
+                </a:r>
+                <a:r>
+                  <a:rPr lang="en-US" sz="2200" dirty="0"/>
+                  <a:t> de Fibonacci</a:t>
                 </a:r>
               </a:p>
               <a:p>
@@ -33721,14 +33745,14 @@
                     </m:oMath>
                   </m:oMathPara>
                 </a14:m>
-                <a:endParaRPr lang="en-US" sz="2200" b="0"/>
+                <a:endParaRPr lang="en-US" sz="2200" b="0" dirty="0"/>
               </a:p>
               <a:p>
                 <a:pPr marL="201168" lvl="1" indent="0">
                   <a:buNone/>
                 </a:pPr>
                 <a:r>
-                  <a:rPr lang="en-US" sz="2200" b="0"/>
+                  <a:rPr lang="en-US" sz="2200" b="0" dirty="0"/>
                   <a:t>… de modo que </a:t>
                 </a:r>
                 <a14:m>
@@ -33867,15 +33891,39 @@
                     </m:d>
                   </m:oMath>
                 </a14:m>
-                <a:endParaRPr lang="en-US" sz="2200" b="0"/>
+                <a:endParaRPr lang="en-US" sz="2200" b="0" dirty="0"/>
               </a:p>
               <a:p>
                 <a:pPr marL="201168" lvl="1" indent="0">
                   <a:buNone/>
                 </a:pPr>
                 <a:r>
-                  <a:rPr lang="en-US" sz="2200"/>
-                  <a:t>Por otra parte, sabemos que </a:t>
+                  <a:rPr lang="en-US" sz="2200" dirty="0"/>
+                  <a:t>Por </a:t>
+                </a:r>
+                <a:r>
+                  <a:rPr lang="en-US" sz="2200" dirty="0" err="1"/>
+                  <a:t>otra</a:t>
+                </a:r>
+                <a:r>
+                  <a:rPr lang="en-US" sz="2200" dirty="0"/>
+                  <a:t> </a:t>
+                </a:r>
+                <a:r>
+                  <a:rPr lang="en-US" sz="2200" dirty="0" err="1"/>
+                  <a:t>parte</a:t>
+                </a:r>
+                <a:r>
+                  <a:rPr lang="en-US" sz="2200" dirty="0"/>
+                  <a:t>, </a:t>
+                </a:r>
+                <a:r>
+                  <a:rPr lang="en-US" sz="2200" dirty="0" err="1"/>
+                  <a:t>sabemos</a:t>
+                </a:r>
+                <a:r>
+                  <a:rPr lang="en-US" sz="2200" dirty="0"/>
+                  <a:t> que </a:t>
                 </a:r>
                 <a14:m>
                   <m:oMath xmlns:m="http://schemas.openxmlformats.org/officeDocument/2006/math">
@@ -34164,10 +34212,10 @@
                       <m:rPr>
                         <m:sty m:val="p"/>
                       </m:rPr>
-                      <a:rPr lang="es-CL" sz="2200" b="0" i="0" smtClean="0">
+                      <a:rPr lang="en-GB" sz="2200" b="0" i="0" smtClean="0">
                         <a:latin typeface="Cambria Math" panose="02040503050406030204" pitchFamily="18" charset="0"/>
                       </a:rPr>
-                      <m:t>Θ</m:t>
+                      <m:t>O</m:t>
                     </m:r>
                     <m:d>
                       <m:dPr>
@@ -34470,7 +34518,7 @@
               <a:blipFill>
                 <a:blip r:embed="rId2"/>
                 <a:stretch>
-                  <a:fillRect r="-587"/>
+                  <a:fillRect r="-635"/>
                 </a:stretch>
               </a:blipFill>
             </p:spPr>
@@ -34479,7 +34527,7 @@
               <a:lstStyle/>
               <a:p>
                 <a:r>
-                  <a:rPr lang="en-US">
+                  <a:rPr lang="es-CL">
                     <a:noFill/>
                   </a:rPr>
                   <a:t> </a:t>
@@ -34547,8 +34595,8 @@
           </a:p>
         </p:txBody>
       </p:sp>
-      <mc:AlternateContent xmlns:mc="http://schemas.openxmlformats.org/markup-compatibility/2006">
-        <mc:Choice xmlns:a14="http://schemas.microsoft.com/office/drawing/2010/main" Requires="a14">
+      <mc:AlternateContent xmlns:mc="http://schemas.openxmlformats.org/markup-compatibility/2006" xmlns:a14="http://schemas.microsoft.com/office/drawing/2010/main">
+        <mc:Choice Requires="a14">
           <p:sp>
             <p:nvSpPr>
               <p:cNvPr id="3" name="Marcador de contenido 2">
@@ -34753,7 +34801,7 @@
             </p:txBody>
           </p:sp>
         </mc:Choice>
-        <mc:Fallback>
+        <mc:Fallback xmlns="">
           <p:sp>
             <p:nvSpPr>
               <p:cNvPr id="3" name="Marcador de contenido 2">

</xml_diff>